<commit_message>
Add new slides and svgs
</commit_message>
<xml_diff>
--- a/ppt_build/price_tag.pptx
+++ b/ppt_build/price_tag.pptx
@@ -6,7 +6,8 @@
   </p:sldMasterIdLst>
   <p:sldIdLst>
     <p:sldId id="256" r:id="rId2"/>
-    <p:sldId id="257" r:id="rId3"/>
+    <p:sldId id="258" r:id="rId3"/>
+    <p:sldId id="257" r:id="rId4"/>
   </p:sldIdLst>
   <p:sldSz cx="12192000" cy="6858000"/>
   <p:notesSz cx="6858000" cy="9144000"/>
@@ -3363,6 +3364,19 @@
           <a:prstGeom prst="ellipse">
             <a:avLst/>
           </a:prstGeom>
+          <a:solidFill>
+            <a:srgbClr val="333642"/>
+          </a:solidFill>
+          <a:ln>
+            <a:noFill/>
+          </a:ln>
+          <a:effectLst>
+            <a:outerShdw blurRad="50800" dist="38100" dir="2700000" algn="tl" rotWithShape="0">
+              <a:prstClr val="black">
+                <a:alpha val="40000"/>
+              </a:prstClr>
+            </a:outerShdw>
+          </a:effectLst>
         </p:spPr>
         <p:style>
           <a:lnRef idx="2">
@@ -3579,76 +3593,6 @@
           </a:p>
         </p:txBody>
       </p:sp>
-      <p:pic>
-        <p:nvPicPr>
-          <p:cNvPr id="18" name="Picture 17">
-            <a:extLst>
-              <a:ext uri="{FF2B5EF4-FFF2-40B4-BE49-F238E27FC236}">
-                <a16:creationId xmlns:a16="http://schemas.microsoft.com/office/drawing/2014/main" id="{37A740B2-4812-E340-986C-7B1B28B61DF4}"/>
-              </a:ext>
-            </a:extLst>
-          </p:cNvPr>
-          <p:cNvPicPr>
-            <a:picLocks noChangeAspect="1"/>
-          </p:cNvPicPr>
-          <p:nvPr/>
-        </p:nvPicPr>
-        <p:blipFill>
-          <a:blip r:embed="rId2"/>
-          <a:stretch>
-            <a:fillRect/>
-          </a:stretch>
-        </p:blipFill>
-        <p:spPr>
-          <a:xfrm>
-            <a:off x="9455150" y="-1863050"/>
-            <a:ext cx="5473700" cy="2997200"/>
-          </a:xfrm>
-          <a:prstGeom prst="rect">
-            <a:avLst/>
-          </a:prstGeom>
-        </p:spPr>
-      </p:pic>
-      <p:sp>
-        <p:nvSpPr>
-          <p:cNvPr id="29" name="TextBox 28">
-            <a:extLst>
-              <a:ext uri="{FF2B5EF4-FFF2-40B4-BE49-F238E27FC236}">
-                <a16:creationId xmlns:a16="http://schemas.microsoft.com/office/drawing/2014/main" id="{C4C771C2-8591-D245-BB27-820A2CE37644}"/>
-              </a:ext>
-            </a:extLst>
-          </p:cNvPr>
-          <p:cNvSpPr txBox="1"/>
-          <p:nvPr/>
-        </p:nvSpPr>
-        <p:spPr>
-          <a:xfrm>
-            <a:off x="2575646" y="1394355"/>
-            <a:ext cx="1582887" cy="3770263"/>
-          </a:xfrm>
-          <a:prstGeom prst="rect">
-            <a:avLst/>
-          </a:prstGeom>
-          <a:noFill/>
-        </p:spPr>
-        <p:txBody>
-          <a:bodyPr wrap="square" rtlCol="0">
-            <a:spAutoFit/>
-          </a:bodyPr>
-          <a:lstStyle/>
-          <a:p>
-            <a:r>
-              <a:rPr lang="en-DE" sz="23900" b="1" dirty="0">
-                <a:solidFill>
-                  <a:srgbClr val="B5B4B6"/>
-                </a:solidFill>
-                <a:latin typeface="Syntax LT" panose="02000503020000020004" pitchFamily="2" charset="0"/>
-              </a:rPr>
-              <a:t>$</a:t>
-            </a:r>
-          </a:p>
-        </p:txBody>
-      </p:sp>
       <p:sp>
         <p:nvSpPr>
           <p:cNvPr id="12" name="Freeform 11">
@@ -3713,9 +3657,7 @@
             </a:pathLst>
           </a:custGeom>
           <a:solidFill>
-            <a:srgbClr val="2B2B35">
-              <a:alpha val="49804"/>
-            </a:srgbClr>
+            <a:srgbClr val="333642"/>
           </a:solidFill>
           <a:ln>
             <a:noFill/>
@@ -3935,8 +3877,8 @@
             </a:pathLst>
           </a:custGeom>
           <a:solidFill>
-            <a:srgbClr val="A8D6F4">
-              <a:alpha val="50196"/>
+            <a:srgbClr val="98A6AD">
+              <a:alpha val="49804"/>
             </a:srgbClr>
           </a:solidFill>
           <a:ln>
@@ -4259,6 +4201,282 @@
           </a:p>
         </p:txBody>
       </p:sp>
+      <p:sp>
+        <p:nvSpPr>
+          <p:cNvPr id="37" name="TextBox 36">
+            <a:extLst>
+              <a:ext uri="{FF2B5EF4-FFF2-40B4-BE49-F238E27FC236}">
+                <a16:creationId xmlns:a16="http://schemas.microsoft.com/office/drawing/2014/main" id="{DF639AF4-E9D6-6E41-AB6E-6B9FD22E0E75}"/>
+              </a:ext>
+            </a:extLst>
+          </p:cNvPr>
+          <p:cNvSpPr txBox="1"/>
+          <p:nvPr/>
+        </p:nvSpPr>
+        <p:spPr>
+          <a:xfrm>
+            <a:off x="2834515" y="1923654"/>
+            <a:ext cx="1330852" cy="2710320"/>
+          </a:xfrm>
+          <a:custGeom>
+            <a:avLst/>
+            <a:gdLst/>
+            <a:ahLst/>
+            <a:cxnLst/>
+            <a:rect l="l" t="t" r="r" b="b"/>
+            <a:pathLst>
+              <a:path w="1330852" h="2710320">
+                <a:moveTo>
+                  <a:pt x="607695" y="0"/>
+                </a:moveTo>
+                <a:lnTo>
+                  <a:pt x="814311" y="0"/>
+                </a:lnTo>
+                <a:lnTo>
+                  <a:pt x="814311" y="196219"/>
+                </a:lnTo>
+                <a:cubicBezTo>
+                  <a:pt x="889956" y="199543"/>
+                  <a:pt x="974084" y="217853"/>
+                  <a:pt x="1066694" y="251149"/>
+                </a:cubicBezTo>
+                <a:cubicBezTo>
+                  <a:pt x="1159304" y="284446"/>
+                  <a:pt x="1240267" y="326779"/>
+                  <a:pt x="1309582" y="378148"/>
+                </a:cubicBezTo>
+                <a:lnTo>
+                  <a:pt x="1189848" y="607695"/>
+                </a:lnTo>
+                <a:cubicBezTo>
+                  <a:pt x="1117336" y="567689"/>
+                  <a:pt x="1051415" y="531860"/>
+                  <a:pt x="992085" y="500209"/>
+                </a:cubicBezTo>
+                <a:cubicBezTo>
+                  <a:pt x="932756" y="468559"/>
+                  <a:pt x="873498" y="452733"/>
+                  <a:pt x="814311" y="452733"/>
+                </a:cubicBezTo>
+                <a:lnTo>
+                  <a:pt x="814311" y="1184388"/>
+                </a:lnTo>
+                <a:cubicBezTo>
+                  <a:pt x="862990" y="1208728"/>
+                  <a:pt x="919471" y="1238812"/>
+                  <a:pt x="983753" y="1274641"/>
+                </a:cubicBezTo>
+                <a:cubicBezTo>
+                  <a:pt x="1048036" y="1310469"/>
+                  <a:pt x="1105862" y="1351971"/>
+                  <a:pt x="1157231" y="1399147"/>
+                </a:cubicBezTo>
+                <a:cubicBezTo>
+                  <a:pt x="1208601" y="1446323"/>
+                  <a:pt x="1250380" y="1503175"/>
+                  <a:pt x="1282568" y="1569705"/>
+                </a:cubicBezTo>
+                <a:cubicBezTo>
+                  <a:pt x="1314757" y="1636235"/>
+                  <a:pt x="1330852" y="1714618"/>
+                  <a:pt x="1330852" y="1804855"/>
+                </a:cubicBezTo>
+                <a:cubicBezTo>
+                  <a:pt x="1330852" y="1876132"/>
+                  <a:pt x="1319576" y="1946658"/>
+                  <a:pt x="1297025" y="2016432"/>
+                </a:cubicBezTo>
+                <a:cubicBezTo>
+                  <a:pt x="1274474" y="2086206"/>
+                  <a:pt x="1240829" y="2149326"/>
+                  <a:pt x="1196091" y="2205791"/>
+                </a:cubicBezTo>
+                <a:cubicBezTo>
+                  <a:pt x="1151352" y="2262256"/>
+                  <a:pt x="1094974" y="2310681"/>
+                  <a:pt x="1026957" y="2351068"/>
+                </a:cubicBezTo>
+                <a:cubicBezTo>
+                  <a:pt x="958939" y="2391454"/>
+                  <a:pt x="888057" y="2417645"/>
+                  <a:pt x="814311" y="2429641"/>
+                </a:cubicBezTo>
+                <a:lnTo>
+                  <a:pt x="814311" y="2710320"/>
+                </a:lnTo>
+                <a:lnTo>
+                  <a:pt x="607695" y="2710320"/>
+                </a:lnTo>
+                <a:lnTo>
+                  <a:pt x="607695" y="2439896"/>
+                </a:lnTo>
+                <a:cubicBezTo>
+                  <a:pt x="502994" y="2439896"/>
+                  <a:pt x="402297" y="2426381"/>
+                  <a:pt x="305604" y="2399351"/>
+                </a:cubicBezTo>
+                <a:cubicBezTo>
+                  <a:pt x="208911" y="2372321"/>
+                  <a:pt x="107042" y="2323532"/>
+                  <a:pt x="0" y="2252982"/>
+                </a:cubicBezTo>
+                <a:lnTo>
+                  <a:pt x="136494" y="2023625"/>
+                </a:lnTo>
+                <a:cubicBezTo>
+                  <a:pt x="223976" y="2078760"/>
+                  <a:pt x="305857" y="2118878"/>
+                  <a:pt x="382135" y="2143977"/>
+                </a:cubicBezTo>
+                <a:cubicBezTo>
+                  <a:pt x="458414" y="2169076"/>
+                  <a:pt x="533600" y="2181625"/>
+                  <a:pt x="607695" y="2181625"/>
+                </a:cubicBezTo>
+                <a:lnTo>
+                  <a:pt x="607695" y="1433021"/>
+                </a:lnTo>
+                <a:cubicBezTo>
+                  <a:pt x="555249" y="1410074"/>
+                  <a:pt x="494741" y="1382499"/>
+                  <a:pt x="426169" y="1350294"/>
+                </a:cubicBezTo>
+                <a:cubicBezTo>
+                  <a:pt x="357598" y="1318089"/>
+                  <a:pt x="295673" y="1277529"/>
+                  <a:pt x="240395" y="1228613"/>
+                </a:cubicBezTo>
+                <a:cubicBezTo>
+                  <a:pt x="185117" y="1179696"/>
+                  <a:pt x="139841" y="1118903"/>
+                  <a:pt x="104566" y="1046233"/>
+                </a:cubicBezTo>
+                <a:cubicBezTo>
+                  <a:pt x="69291" y="973563"/>
+                  <a:pt x="51654" y="883089"/>
+                  <a:pt x="51654" y="774811"/>
+                </a:cubicBezTo>
+                <a:cubicBezTo>
+                  <a:pt x="51654" y="696444"/>
+                  <a:pt x="65968" y="623845"/>
+                  <a:pt x="94596" y="557015"/>
+                </a:cubicBezTo>
+                <a:cubicBezTo>
+                  <a:pt x="123224" y="490184"/>
+                  <a:pt x="163761" y="431092"/>
+                  <a:pt x="216206" y="379738"/>
+                </a:cubicBezTo>
+                <a:cubicBezTo>
+                  <a:pt x="268651" y="328385"/>
+                  <a:pt x="330244" y="286867"/>
+                  <a:pt x="400983" y="255185"/>
+                </a:cubicBezTo>
+                <a:cubicBezTo>
+                  <a:pt x="471723" y="223502"/>
+                  <a:pt x="540627" y="204306"/>
+                  <a:pt x="607695" y="197596"/>
+                </a:cubicBezTo>
+                <a:lnTo>
+                  <a:pt x="607695" y="0"/>
+                </a:lnTo>
+                <a:close/>
+                <a:moveTo>
+                  <a:pt x="607695" y="452733"/>
+                </a:moveTo>
+                <a:cubicBezTo>
+                  <a:pt x="597123" y="461564"/>
+                  <a:pt x="575347" y="475403"/>
+                  <a:pt x="542367" y="494251"/>
+                </a:cubicBezTo>
+                <a:cubicBezTo>
+                  <a:pt x="509387" y="513099"/>
+                  <a:pt x="480435" y="536370"/>
+                  <a:pt x="455510" y="564065"/>
+                </a:cubicBezTo>
+                <a:cubicBezTo>
+                  <a:pt x="430585" y="591759"/>
+                  <a:pt x="410724" y="624573"/>
+                  <a:pt x="395927" y="662507"/>
+                </a:cubicBezTo>
+                <a:cubicBezTo>
+                  <a:pt x="381130" y="700440"/>
+                  <a:pt x="373732" y="742939"/>
+                  <a:pt x="373732" y="790004"/>
+                </a:cubicBezTo>
+                <a:cubicBezTo>
+                  <a:pt x="373732" y="868466"/>
+                  <a:pt x="396655" y="931562"/>
+                  <a:pt x="442501" y="979291"/>
+                </a:cubicBezTo>
+                <a:cubicBezTo>
+                  <a:pt x="488347" y="1027021"/>
+                  <a:pt x="543412" y="1070272"/>
+                  <a:pt x="607695" y="1109044"/>
+                </a:cubicBezTo>
+                <a:lnTo>
+                  <a:pt x="607695" y="452733"/>
+                </a:lnTo>
+                <a:close/>
+                <a:moveTo>
+                  <a:pt x="814311" y="1513161"/>
+                </a:moveTo>
+                <a:lnTo>
+                  <a:pt x="814311" y="2157318"/>
+                </a:lnTo>
+                <a:cubicBezTo>
+                  <a:pt x="854729" y="2135036"/>
+                  <a:pt x="894205" y="2095227"/>
+                  <a:pt x="932740" y="2037891"/>
+                </a:cubicBezTo>
+                <a:cubicBezTo>
+                  <a:pt x="971275" y="1980556"/>
+                  <a:pt x="990542" y="1909967"/>
+                  <a:pt x="990543" y="1826124"/>
+                </a:cubicBezTo>
+                <a:cubicBezTo>
+                  <a:pt x="990542" y="1744655"/>
+                  <a:pt x="970563" y="1680230"/>
+                  <a:pt x="930604" y="1632848"/>
+                </a:cubicBezTo>
+                <a:cubicBezTo>
+                  <a:pt x="890645" y="1585467"/>
+                  <a:pt x="851880" y="1545571"/>
+                  <a:pt x="814311" y="1513161"/>
+                </a:cubicBezTo>
+                <a:close/>
+              </a:path>
+            </a:pathLst>
+          </a:custGeom>
+          <a:solidFill>
+            <a:srgbClr val="BFBFBF">
+              <a:alpha val="50196"/>
+            </a:srgbClr>
+          </a:solidFill>
+          <a:ln>
+            <a:noFill/>
+          </a:ln>
+          <a:effectLst/>
+        </p:spPr>
+        <p:txBody>
+          <a:bodyPr rot="0" spcFirstLastPara="0" vertOverflow="overflow" horzOverflow="overflow" vert="horz" wrap="square" lIns="91440" tIns="45720" rIns="91440" bIns="45720" numCol="1" spcCol="0" rtlCol="0" fromWordArt="0" anchor="t" anchorCtr="0" forceAA="0" compatLnSpc="1">
+            <a:prstTxWarp prst="textNoShape">
+              <a:avLst/>
+            </a:prstTxWarp>
+            <a:noAutofit/>
+          </a:bodyPr>
+          <a:lstStyle/>
+          <a:p>
+            <a:endParaRPr lang="en-DE" sz="23900" b="1" dirty="0">
+              <a:solidFill>
+                <a:schemeClr val="bg1">
+                  <a:lumMod val="75000"/>
+                </a:schemeClr>
+              </a:solidFill>
+              <a:latin typeface="Syntax LT" panose="02000503020000020004" pitchFamily="2" charset="0"/>
+            </a:endParaRPr>
+          </a:p>
+        </p:txBody>
+      </p:sp>
     </p:spTree>
     <p:extLst>
       <p:ext uri="{BB962C8B-B14F-4D97-AF65-F5344CB8AC3E}">
@@ -4273,6 +4491,720 @@
 </file>
 
 <file path=ppt/slides/slide2.xml><?xml version="1.0" encoding="utf-8"?>
+<p:sld xmlns:a="http://schemas.openxmlformats.org/drawingml/2006/main" xmlns:r="http://schemas.openxmlformats.org/officeDocument/2006/relationships" xmlns:p="http://schemas.openxmlformats.org/presentationml/2006/main">
+  <p:cSld>
+    <p:spTree>
+      <p:nvGrpSpPr>
+        <p:cNvPr id="1" name=""/>
+        <p:cNvGrpSpPr/>
+        <p:nvPr/>
+      </p:nvGrpSpPr>
+      <p:grpSpPr>
+        <a:xfrm>
+          <a:off x="0" y="0"/>
+          <a:ext cx="0" cy="0"/>
+          <a:chOff x="0" y="0"/>
+          <a:chExt cx="0" cy="0"/>
+        </a:xfrm>
+      </p:grpSpPr>
+      <p:sp>
+        <p:nvSpPr>
+          <p:cNvPr id="10" name="TextBox 9">
+            <a:extLst>
+              <a:ext uri="{FF2B5EF4-FFF2-40B4-BE49-F238E27FC236}">
+                <a16:creationId xmlns:a16="http://schemas.microsoft.com/office/drawing/2014/main" id="{6C6982E2-5FEB-AE45-B1B1-CED11126053B}"/>
+              </a:ext>
+            </a:extLst>
+          </p:cNvPr>
+          <p:cNvSpPr txBox="1"/>
+          <p:nvPr/>
+        </p:nvSpPr>
+        <p:spPr>
+          <a:xfrm>
+            <a:off x="2984537" y="1909743"/>
+            <a:ext cx="1330852" cy="2710320"/>
+          </a:xfrm>
+          <a:custGeom>
+            <a:avLst/>
+            <a:gdLst/>
+            <a:ahLst/>
+            <a:cxnLst/>
+            <a:rect l="l" t="t" r="r" b="b"/>
+            <a:pathLst>
+              <a:path w="1330852" h="2710320">
+                <a:moveTo>
+                  <a:pt x="607695" y="0"/>
+                </a:moveTo>
+                <a:lnTo>
+                  <a:pt x="814311" y="0"/>
+                </a:lnTo>
+                <a:lnTo>
+                  <a:pt x="814311" y="196219"/>
+                </a:lnTo>
+                <a:cubicBezTo>
+                  <a:pt x="889956" y="199543"/>
+                  <a:pt x="974084" y="217853"/>
+                  <a:pt x="1066694" y="251149"/>
+                </a:cubicBezTo>
+                <a:cubicBezTo>
+                  <a:pt x="1159304" y="284446"/>
+                  <a:pt x="1240267" y="326779"/>
+                  <a:pt x="1309582" y="378148"/>
+                </a:cubicBezTo>
+                <a:lnTo>
+                  <a:pt x="1189848" y="607695"/>
+                </a:lnTo>
+                <a:cubicBezTo>
+                  <a:pt x="1117336" y="567689"/>
+                  <a:pt x="1051415" y="531860"/>
+                  <a:pt x="992085" y="500209"/>
+                </a:cubicBezTo>
+                <a:cubicBezTo>
+                  <a:pt x="932756" y="468559"/>
+                  <a:pt x="873498" y="452733"/>
+                  <a:pt x="814311" y="452733"/>
+                </a:cubicBezTo>
+                <a:lnTo>
+                  <a:pt x="814311" y="1184388"/>
+                </a:lnTo>
+                <a:cubicBezTo>
+                  <a:pt x="862990" y="1208728"/>
+                  <a:pt x="919471" y="1238812"/>
+                  <a:pt x="983753" y="1274641"/>
+                </a:cubicBezTo>
+                <a:cubicBezTo>
+                  <a:pt x="1048036" y="1310469"/>
+                  <a:pt x="1105862" y="1351971"/>
+                  <a:pt x="1157231" y="1399147"/>
+                </a:cubicBezTo>
+                <a:cubicBezTo>
+                  <a:pt x="1208601" y="1446323"/>
+                  <a:pt x="1250380" y="1503175"/>
+                  <a:pt x="1282568" y="1569705"/>
+                </a:cubicBezTo>
+                <a:cubicBezTo>
+                  <a:pt x="1314757" y="1636235"/>
+                  <a:pt x="1330852" y="1714618"/>
+                  <a:pt x="1330852" y="1804855"/>
+                </a:cubicBezTo>
+                <a:cubicBezTo>
+                  <a:pt x="1330852" y="1876132"/>
+                  <a:pt x="1319576" y="1946658"/>
+                  <a:pt x="1297025" y="2016432"/>
+                </a:cubicBezTo>
+                <a:cubicBezTo>
+                  <a:pt x="1274474" y="2086206"/>
+                  <a:pt x="1240829" y="2149326"/>
+                  <a:pt x="1196091" y="2205791"/>
+                </a:cubicBezTo>
+                <a:cubicBezTo>
+                  <a:pt x="1151352" y="2262256"/>
+                  <a:pt x="1094974" y="2310681"/>
+                  <a:pt x="1026957" y="2351068"/>
+                </a:cubicBezTo>
+                <a:cubicBezTo>
+                  <a:pt x="958939" y="2391454"/>
+                  <a:pt x="888057" y="2417645"/>
+                  <a:pt x="814311" y="2429641"/>
+                </a:cubicBezTo>
+                <a:lnTo>
+                  <a:pt x="814311" y="2710320"/>
+                </a:lnTo>
+                <a:lnTo>
+                  <a:pt x="607695" y="2710320"/>
+                </a:lnTo>
+                <a:lnTo>
+                  <a:pt x="607695" y="2439896"/>
+                </a:lnTo>
+                <a:cubicBezTo>
+                  <a:pt x="502994" y="2439896"/>
+                  <a:pt x="402297" y="2426381"/>
+                  <a:pt x="305604" y="2399351"/>
+                </a:cubicBezTo>
+                <a:cubicBezTo>
+                  <a:pt x="208911" y="2372321"/>
+                  <a:pt x="107042" y="2323532"/>
+                  <a:pt x="0" y="2252982"/>
+                </a:cubicBezTo>
+                <a:lnTo>
+                  <a:pt x="136494" y="2023625"/>
+                </a:lnTo>
+                <a:cubicBezTo>
+                  <a:pt x="223976" y="2078760"/>
+                  <a:pt x="305857" y="2118878"/>
+                  <a:pt x="382135" y="2143977"/>
+                </a:cubicBezTo>
+                <a:cubicBezTo>
+                  <a:pt x="458414" y="2169076"/>
+                  <a:pt x="533600" y="2181625"/>
+                  <a:pt x="607695" y="2181625"/>
+                </a:cubicBezTo>
+                <a:lnTo>
+                  <a:pt x="607695" y="1433021"/>
+                </a:lnTo>
+                <a:cubicBezTo>
+                  <a:pt x="555249" y="1410074"/>
+                  <a:pt x="494741" y="1382499"/>
+                  <a:pt x="426169" y="1350294"/>
+                </a:cubicBezTo>
+                <a:cubicBezTo>
+                  <a:pt x="357598" y="1318089"/>
+                  <a:pt x="295673" y="1277529"/>
+                  <a:pt x="240395" y="1228613"/>
+                </a:cubicBezTo>
+                <a:cubicBezTo>
+                  <a:pt x="185117" y="1179696"/>
+                  <a:pt x="139841" y="1118903"/>
+                  <a:pt x="104566" y="1046233"/>
+                </a:cubicBezTo>
+                <a:cubicBezTo>
+                  <a:pt x="69291" y="973563"/>
+                  <a:pt x="51654" y="883089"/>
+                  <a:pt x="51654" y="774811"/>
+                </a:cubicBezTo>
+                <a:cubicBezTo>
+                  <a:pt x="51654" y="696444"/>
+                  <a:pt x="65968" y="623845"/>
+                  <a:pt x="94596" y="557015"/>
+                </a:cubicBezTo>
+                <a:cubicBezTo>
+                  <a:pt x="123224" y="490184"/>
+                  <a:pt x="163761" y="431092"/>
+                  <a:pt x="216206" y="379738"/>
+                </a:cubicBezTo>
+                <a:cubicBezTo>
+                  <a:pt x="268651" y="328385"/>
+                  <a:pt x="330244" y="286867"/>
+                  <a:pt x="400983" y="255185"/>
+                </a:cubicBezTo>
+                <a:cubicBezTo>
+                  <a:pt x="471723" y="223502"/>
+                  <a:pt x="540627" y="204306"/>
+                  <a:pt x="607695" y="197596"/>
+                </a:cubicBezTo>
+                <a:lnTo>
+                  <a:pt x="607695" y="0"/>
+                </a:lnTo>
+                <a:close/>
+                <a:moveTo>
+                  <a:pt x="607695" y="452733"/>
+                </a:moveTo>
+                <a:cubicBezTo>
+                  <a:pt x="597123" y="461564"/>
+                  <a:pt x="575347" y="475403"/>
+                  <a:pt x="542367" y="494251"/>
+                </a:cubicBezTo>
+                <a:cubicBezTo>
+                  <a:pt x="509387" y="513099"/>
+                  <a:pt x="480435" y="536370"/>
+                  <a:pt x="455510" y="564065"/>
+                </a:cubicBezTo>
+                <a:cubicBezTo>
+                  <a:pt x="430585" y="591759"/>
+                  <a:pt x="410724" y="624573"/>
+                  <a:pt x="395927" y="662507"/>
+                </a:cubicBezTo>
+                <a:cubicBezTo>
+                  <a:pt x="381130" y="700440"/>
+                  <a:pt x="373732" y="742939"/>
+                  <a:pt x="373732" y="790004"/>
+                </a:cubicBezTo>
+                <a:cubicBezTo>
+                  <a:pt x="373732" y="868466"/>
+                  <a:pt x="396655" y="931562"/>
+                  <a:pt x="442501" y="979291"/>
+                </a:cubicBezTo>
+                <a:cubicBezTo>
+                  <a:pt x="488347" y="1027021"/>
+                  <a:pt x="543412" y="1070272"/>
+                  <a:pt x="607695" y="1109044"/>
+                </a:cubicBezTo>
+                <a:lnTo>
+                  <a:pt x="607695" y="452733"/>
+                </a:lnTo>
+                <a:close/>
+                <a:moveTo>
+                  <a:pt x="814311" y="1513161"/>
+                </a:moveTo>
+                <a:lnTo>
+                  <a:pt x="814311" y="2157318"/>
+                </a:lnTo>
+                <a:cubicBezTo>
+                  <a:pt x="854729" y="2135036"/>
+                  <a:pt x="894205" y="2095227"/>
+                  <a:pt x="932740" y="2037891"/>
+                </a:cubicBezTo>
+                <a:cubicBezTo>
+                  <a:pt x="971275" y="1980556"/>
+                  <a:pt x="990542" y="1909967"/>
+                  <a:pt x="990543" y="1826124"/>
+                </a:cubicBezTo>
+                <a:cubicBezTo>
+                  <a:pt x="990542" y="1744655"/>
+                  <a:pt x="970563" y="1680230"/>
+                  <a:pt x="930604" y="1632848"/>
+                </a:cubicBezTo>
+                <a:cubicBezTo>
+                  <a:pt x="890645" y="1585467"/>
+                  <a:pt x="851880" y="1545571"/>
+                  <a:pt x="814311" y="1513161"/>
+                </a:cubicBezTo>
+                <a:close/>
+              </a:path>
+            </a:pathLst>
+          </a:custGeom>
+          <a:solidFill>
+            <a:schemeClr val="bg1">
+              <a:lumMod val="75000"/>
+            </a:schemeClr>
+          </a:solidFill>
+          <a:ln>
+            <a:noFill/>
+          </a:ln>
+          <a:effectLst/>
+        </p:spPr>
+        <p:txBody>
+          <a:bodyPr rot="0" spcFirstLastPara="0" vertOverflow="overflow" horzOverflow="overflow" vert="horz" wrap="square" lIns="91440" tIns="45720" rIns="91440" bIns="45720" numCol="1" spcCol="0" rtlCol="0" fromWordArt="0" anchor="t" anchorCtr="0" forceAA="0" compatLnSpc="1">
+            <a:prstTxWarp prst="textNoShape">
+              <a:avLst/>
+            </a:prstTxWarp>
+            <a:noAutofit/>
+          </a:bodyPr>
+          <a:lstStyle/>
+          <a:p>
+            <a:endParaRPr lang="en-DE" sz="23900" b="1" dirty="0">
+              <a:solidFill>
+                <a:schemeClr val="bg1">
+                  <a:lumMod val="75000"/>
+                </a:schemeClr>
+              </a:solidFill>
+              <a:latin typeface="Syntax LT" panose="02000503020000020004" pitchFamily="2" charset="0"/>
+            </a:endParaRPr>
+          </a:p>
+        </p:txBody>
+      </p:sp>
+      <p:sp>
+        <p:nvSpPr>
+          <p:cNvPr id="9" name="TextBox 8">
+            <a:extLst>
+              <a:ext uri="{FF2B5EF4-FFF2-40B4-BE49-F238E27FC236}">
+                <a16:creationId xmlns:a16="http://schemas.microsoft.com/office/drawing/2014/main" id="{844463BF-33A2-6841-BF42-E2F3B5D96663}"/>
+              </a:ext>
+            </a:extLst>
+          </p:cNvPr>
+          <p:cNvSpPr txBox="1"/>
+          <p:nvPr/>
+        </p:nvSpPr>
+        <p:spPr>
+          <a:xfrm>
+            <a:off x="5546535" y="1405315"/>
+            <a:ext cx="1887327" cy="3329533"/>
+          </a:xfrm>
+          <a:custGeom>
+            <a:avLst/>
+            <a:gdLst/>
+            <a:ahLst/>
+            <a:cxnLst/>
+            <a:rect l="l" t="t" r="r" b="b"/>
+            <a:pathLst>
+              <a:path w="1887327" h="3329533">
+                <a:moveTo>
+                  <a:pt x="0" y="0"/>
+                </a:moveTo>
+                <a:lnTo>
+                  <a:pt x="1887327" y="0"/>
+                </a:lnTo>
+                <a:lnTo>
+                  <a:pt x="1887327" y="3329533"/>
+                </a:lnTo>
+                <a:lnTo>
+                  <a:pt x="0" y="3329533"/>
+                </a:lnTo>
+                <a:lnTo>
+                  <a:pt x="0" y="0"/>
+                </a:lnTo>
+                <a:close/>
+                <a:moveTo>
+                  <a:pt x="893599" y="295023"/>
+                </a:moveTo>
+                <a:lnTo>
+                  <a:pt x="893599" y="492619"/>
+                </a:lnTo>
+                <a:cubicBezTo>
+                  <a:pt x="826531" y="499329"/>
+                  <a:pt x="757627" y="518525"/>
+                  <a:pt x="686887" y="550208"/>
+                </a:cubicBezTo>
+                <a:cubicBezTo>
+                  <a:pt x="616148" y="581890"/>
+                  <a:pt x="554555" y="623408"/>
+                  <a:pt x="502110" y="674761"/>
+                </a:cubicBezTo>
+                <a:cubicBezTo>
+                  <a:pt x="449665" y="726115"/>
+                  <a:pt x="409128" y="785207"/>
+                  <a:pt x="380500" y="852038"/>
+                </a:cubicBezTo>
+                <a:cubicBezTo>
+                  <a:pt x="351872" y="918868"/>
+                  <a:pt x="337558" y="991467"/>
+                  <a:pt x="337558" y="1069834"/>
+                </a:cubicBezTo>
+                <a:cubicBezTo>
+                  <a:pt x="337558" y="1178112"/>
+                  <a:pt x="355195" y="1268586"/>
+                  <a:pt x="390470" y="1341256"/>
+                </a:cubicBezTo>
+                <a:cubicBezTo>
+                  <a:pt x="425745" y="1413926"/>
+                  <a:pt x="471021" y="1474719"/>
+                  <a:pt x="526299" y="1523636"/>
+                </a:cubicBezTo>
+                <a:cubicBezTo>
+                  <a:pt x="581577" y="1572552"/>
+                  <a:pt x="643502" y="1613112"/>
+                  <a:pt x="712073" y="1645317"/>
+                </a:cubicBezTo>
+                <a:cubicBezTo>
+                  <a:pt x="780645" y="1677522"/>
+                  <a:pt x="841153" y="1705097"/>
+                  <a:pt x="893599" y="1728044"/>
+                </a:cubicBezTo>
+                <a:lnTo>
+                  <a:pt x="893599" y="2476648"/>
+                </a:lnTo>
+                <a:cubicBezTo>
+                  <a:pt x="819504" y="2476648"/>
+                  <a:pt x="744318" y="2464099"/>
+                  <a:pt x="668039" y="2439000"/>
+                </a:cubicBezTo>
+                <a:cubicBezTo>
+                  <a:pt x="591761" y="2413901"/>
+                  <a:pt x="509880" y="2373783"/>
+                  <a:pt x="422398" y="2318648"/>
+                </a:cubicBezTo>
+                <a:lnTo>
+                  <a:pt x="285904" y="2548005"/>
+                </a:lnTo>
+                <a:cubicBezTo>
+                  <a:pt x="392946" y="2618555"/>
+                  <a:pt x="494815" y="2667344"/>
+                  <a:pt x="591508" y="2694374"/>
+                </a:cubicBezTo>
+                <a:cubicBezTo>
+                  <a:pt x="688201" y="2721404"/>
+                  <a:pt x="788898" y="2734919"/>
+                  <a:pt x="893599" y="2734919"/>
+                </a:cubicBezTo>
+                <a:lnTo>
+                  <a:pt x="893599" y="3005343"/>
+                </a:lnTo>
+                <a:lnTo>
+                  <a:pt x="1100215" y="3005343"/>
+                </a:lnTo>
+                <a:lnTo>
+                  <a:pt x="1100215" y="2724664"/>
+                </a:lnTo>
+                <a:cubicBezTo>
+                  <a:pt x="1173961" y="2712668"/>
+                  <a:pt x="1244843" y="2686477"/>
+                  <a:pt x="1312861" y="2646091"/>
+                </a:cubicBezTo>
+                <a:cubicBezTo>
+                  <a:pt x="1380878" y="2605704"/>
+                  <a:pt x="1437256" y="2557279"/>
+                  <a:pt x="1481995" y="2500814"/>
+                </a:cubicBezTo>
+                <a:cubicBezTo>
+                  <a:pt x="1526733" y="2444349"/>
+                  <a:pt x="1560378" y="2381229"/>
+                  <a:pt x="1582929" y="2311455"/>
+                </a:cubicBezTo>
+                <a:cubicBezTo>
+                  <a:pt x="1605480" y="2241681"/>
+                  <a:pt x="1616756" y="2171155"/>
+                  <a:pt x="1616756" y="2099878"/>
+                </a:cubicBezTo>
+                <a:cubicBezTo>
+                  <a:pt x="1616756" y="2009641"/>
+                  <a:pt x="1600661" y="1931258"/>
+                  <a:pt x="1568472" y="1864728"/>
+                </a:cubicBezTo>
+                <a:cubicBezTo>
+                  <a:pt x="1536284" y="1798198"/>
+                  <a:pt x="1494505" y="1741346"/>
+                  <a:pt x="1443135" y="1694170"/>
+                </a:cubicBezTo>
+                <a:cubicBezTo>
+                  <a:pt x="1391766" y="1646994"/>
+                  <a:pt x="1333940" y="1605492"/>
+                  <a:pt x="1269657" y="1569664"/>
+                </a:cubicBezTo>
+                <a:cubicBezTo>
+                  <a:pt x="1205375" y="1533835"/>
+                  <a:pt x="1148894" y="1503751"/>
+                  <a:pt x="1100215" y="1479411"/>
+                </a:cubicBezTo>
+                <a:lnTo>
+                  <a:pt x="1100215" y="747756"/>
+                </a:lnTo>
+                <a:cubicBezTo>
+                  <a:pt x="1159402" y="747756"/>
+                  <a:pt x="1218660" y="763582"/>
+                  <a:pt x="1277989" y="795232"/>
+                </a:cubicBezTo>
+                <a:cubicBezTo>
+                  <a:pt x="1337319" y="826883"/>
+                  <a:pt x="1403240" y="862712"/>
+                  <a:pt x="1475752" y="902718"/>
+                </a:cubicBezTo>
+                <a:lnTo>
+                  <a:pt x="1595486" y="673171"/>
+                </a:lnTo>
+                <a:cubicBezTo>
+                  <a:pt x="1526171" y="621802"/>
+                  <a:pt x="1445208" y="579469"/>
+                  <a:pt x="1352598" y="546172"/>
+                </a:cubicBezTo>
+                <a:cubicBezTo>
+                  <a:pt x="1259988" y="512876"/>
+                  <a:pt x="1175860" y="494566"/>
+                  <a:pt x="1100215" y="491242"/>
+                </a:cubicBezTo>
+                <a:lnTo>
+                  <a:pt x="1100215" y="295023"/>
+                </a:lnTo>
+                <a:lnTo>
+                  <a:pt x="893599" y="295023"/>
+                </a:lnTo>
+                <a:close/>
+              </a:path>
+            </a:pathLst>
+          </a:custGeom>
+          <a:solidFill>
+            <a:schemeClr val="bg1">
+              <a:lumMod val="75000"/>
+            </a:schemeClr>
+          </a:solidFill>
+          <a:ln>
+            <a:noFill/>
+          </a:ln>
+          <a:effectLst/>
+        </p:spPr>
+        <p:txBody>
+          <a:bodyPr rot="0" spcFirstLastPara="0" vertOverflow="overflow" horzOverflow="overflow" vert="horz" wrap="square" lIns="91440" tIns="45720" rIns="91440" bIns="45720" numCol="1" spcCol="0" rtlCol="0" fromWordArt="0" anchor="t" anchorCtr="0" forceAA="0" compatLnSpc="1">
+            <a:prstTxWarp prst="textNoShape">
+              <a:avLst/>
+            </a:prstTxWarp>
+            <a:noAutofit/>
+          </a:bodyPr>
+          <a:lstStyle/>
+          <a:p>
+            <a:endParaRPr lang="en-DE" sz="23900" b="1" dirty="0">
+              <a:solidFill>
+                <a:schemeClr val="bg1">
+                  <a:lumMod val="75000"/>
+                </a:schemeClr>
+              </a:solidFill>
+              <a:latin typeface="Syntax LT" panose="02000503020000020004" pitchFamily="2" charset="0"/>
+            </a:endParaRPr>
+          </a:p>
+        </p:txBody>
+      </p:sp>
+      <p:sp>
+        <p:nvSpPr>
+          <p:cNvPr id="8" name="TextBox 7">
+            <a:extLst>
+              <a:ext uri="{FF2B5EF4-FFF2-40B4-BE49-F238E27FC236}">
+                <a16:creationId xmlns:a16="http://schemas.microsoft.com/office/drawing/2014/main" id="{90E4B3F3-B44F-774F-9260-243AA074F9AD}"/>
+              </a:ext>
+            </a:extLst>
+          </p:cNvPr>
+          <p:cNvSpPr txBox="1"/>
+          <p:nvPr/>
+        </p:nvSpPr>
+        <p:spPr>
+          <a:xfrm>
+            <a:off x="4580017" y="1405315"/>
+            <a:ext cx="233963" cy="656311"/>
+          </a:xfrm>
+          <a:custGeom>
+            <a:avLst/>
+            <a:gdLst/>
+            <a:ahLst/>
+            <a:cxnLst/>
+            <a:rect l="l" t="t" r="r" b="b"/>
+            <a:pathLst>
+              <a:path w="233963" h="656311">
+                <a:moveTo>
+                  <a:pt x="233963" y="0"/>
+                </a:moveTo>
+                <a:lnTo>
+                  <a:pt x="233963" y="656311"/>
+                </a:lnTo>
+                <a:cubicBezTo>
+                  <a:pt x="169680" y="617539"/>
+                  <a:pt x="114615" y="574288"/>
+                  <a:pt x="68769" y="526558"/>
+                </a:cubicBezTo>
+                <a:cubicBezTo>
+                  <a:pt x="22923" y="478829"/>
+                  <a:pt x="0" y="415733"/>
+                  <a:pt x="0" y="337271"/>
+                </a:cubicBezTo>
+                <a:cubicBezTo>
+                  <a:pt x="0" y="290206"/>
+                  <a:pt x="7398" y="247707"/>
+                  <a:pt x="22195" y="209774"/>
+                </a:cubicBezTo>
+                <a:cubicBezTo>
+                  <a:pt x="36992" y="171840"/>
+                  <a:pt x="56853" y="139026"/>
+                  <a:pt x="81778" y="111332"/>
+                </a:cubicBezTo>
+                <a:cubicBezTo>
+                  <a:pt x="106703" y="83637"/>
+                  <a:pt x="135655" y="60366"/>
+                  <a:pt x="168635" y="41518"/>
+                </a:cubicBezTo>
+                <a:cubicBezTo>
+                  <a:pt x="201615" y="22670"/>
+                  <a:pt x="223391" y="8831"/>
+                  <a:pt x="233963" y="0"/>
+                </a:cubicBezTo>
+                <a:close/>
+              </a:path>
+            </a:pathLst>
+          </a:custGeom>
+          <a:solidFill>
+            <a:schemeClr val="bg1">
+              <a:lumMod val="75000"/>
+            </a:schemeClr>
+          </a:solidFill>
+          <a:ln>
+            <a:noFill/>
+          </a:ln>
+          <a:effectLst/>
+        </p:spPr>
+        <p:txBody>
+          <a:bodyPr rot="0" spcFirstLastPara="0" vertOverflow="overflow" horzOverflow="overflow" vert="horz" wrap="square" lIns="91440" tIns="45720" rIns="91440" bIns="45720" numCol="1" spcCol="0" rtlCol="0" fromWordArt="0" anchor="t" anchorCtr="0" forceAA="0" compatLnSpc="1">
+            <a:prstTxWarp prst="textNoShape">
+              <a:avLst/>
+            </a:prstTxWarp>
+            <a:noAutofit/>
+          </a:bodyPr>
+          <a:lstStyle/>
+          <a:p>
+            <a:endParaRPr lang="en-DE" sz="23900" b="1" dirty="0">
+              <a:solidFill>
+                <a:schemeClr val="bg1">
+                  <a:lumMod val="75000"/>
+                </a:schemeClr>
+              </a:solidFill>
+              <a:latin typeface="Syntax LT" panose="02000503020000020004" pitchFamily="2" charset="0"/>
+            </a:endParaRPr>
+          </a:p>
+        </p:txBody>
+      </p:sp>
+      <p:sp>
+        <p:nvSpPr>
+          <p:cNvPr id="7" name="TextBox 6">
+            <a:extLst>
+              <a:ext uri="{FF2B5EF4-FFF2-40B4-BE49-F238E27FC236}">
+                <a16:creationId xmlns:a16="http://schemas.microsoft.com/office/drawing/2014/main" id="{4D3D7653-9649-474E-801E-4316359495DD}"/>
+              </a:ext>
+            </a:extLst>
+          </p:cNvPr>
+          <p:cNvSpPr txBox="1"/>
+          <p:nvPr/>
+        </p:nvSpPr>
+        <p:spPr>
+          <a:xfrm>
+            <a:off x="5047944" y="2166476"/>
+            <a:ext cx="176232" cy="644157"/>
+          </a:xfrm>
+          <a:custGeom>
+            <a:avLst/>
+            <a:gdLst/>
+            <a:ahLst/>
+            <a:cxnLst/>
+            <a:rect l="l" t="t" r="r" b="b"/>
+            <a:pathLst>
+              <a:path w="176232" h="644157">
+                <a:moveTo>
+                  <a:pt x="0" y="0"/>
+                </a:moveTo>
+                <a:cubicBezTo>
+                  <a:pt x="37569" y="32410"/>
+                  <a:pt x="76334" y="72306"/>
+                  <a:pt x="116293" y="119687"/>
+                </a:cubicBezTo>
+                <a:cubicBezTo>
+                  <a:pt x="156252" y="167069"/>
+                  <a:pt x="176231" y="231494"/>
+                  <a:pt x="176232" y="312963"/>
+                </a:cubicBezTo>
+                <a:cubicBezTo>
+                  <a:pt x="176231" y="396806"/>
+                  <a:pt x="156964" y="467395"/>
+                  <a:pt x="118429" y="524730"/>
+                </a:cubicBezTo>
+                <a:cubicBezTo>
+                  <a:pt x="79894" y="582066"/>
+                  <a:pt x="40418" y="621875"/>
+                  <a:pt x="0" y="644157"/>
+                </a:cubicBezTo>
+                <a:lnTo>
+                  <a:pt x="0" y="0"/>
+                </a:lnTo>
+                <a:close/>
+              </a:path>
+            </a:pathLst>
+          </a:custGeom>
+          <a:solidFill>
+            <a:schemeClr val="bg1">
+              <a:lumMod val="75000"/>
+            </a:schemeClr>
+          </a:solidFill>
+          <a:ln>
+            <a:noFill/>
+          </a:ln>
+          <a:effectLst/>
+        </p:spPr>
+        <p:txBody>
+          <a:bodyPr rot="0" spcFirstLastPara="0" vertOverflow="overflow" horzOverflow="overflow" vert="horz" wrap="square" lIns="91440" tIns="45720" rIns="91440" bIns="45720" numCol="1" spcCol="0" rtlCol="0" fromWordArt="0" anchor="t" anchorCtr="0" forceAA="0" compatLnSpc="1">
+            <a:prstTxWarp prst="textNoShape">
+              <a:avLst/>
+            </a:prstTxWarp>
+            <a:noAutofit/>
+          </a:bodyPr>
+          <a:lstStyle/>
+          <a:p>
+            <a:endParaRPr lang="en-DE" sz="23900" b="1" dirty="0">
+              <a:solidFill>
+                <a:schemeClr val="bg1">
+                  <a:lumMod val="75000"/>
+                </a:schemeClr>
+              </a:solidFill>
+              <a:latin typeface="Syntax LT" panose="02000503020000020004" pitchFamily="2" charset="0"/>
+            </a:endParaRPr>
+          </a:p>
+        </p:txBody>
+      </p:sp>
+    </p:spTree>
+    <p:extLst>
+      <p:ext uri="{BB962C8B-B14F-4D97-AF65-F5344CB8AC3E}">
+        <p14:creationId xmlns:p14="http://schemas.microsoft.com/office/powerpoint/2010/main" val="3422623133"/>
+      </p:ext>
+    </p:extLst>
+  </p:cSld>
+  <p:clrMapOvr>
+    <a:masterClrMapping/>
+  </p:clrMapOvr>
+</p:sld>
+</file>
+
+<file path=ppt/slides/slide3.xml><?xml version="1.0" encoding="utf-8"?>
 <p:sld xmlns:a="http://schemas.openxmlformats.org/drawingml/2006/main" xmlns:r="http://schemas.openxmlformats.org/officeDocument/2006/relationships" xmlns:p="http://schemas.openxmlformats.org/presentationml/2006/main">
   <p:cSld>
     <p:spTree>

</xml_diff>